<commit_message>
Add AddOrUpdateArea Cervice Method
</commit_message>
<xml_diff>
--- a/Documents/MyPresentation.pptx
+++ b/Documents/MyPresentation.pptx
@@ -115,7 +115,7 @@
   </p:defaultTextStyle>
   <p:extLst>
     <p:ext uri="{EFAFB233-063F-42B5-8137-9DF3F51BA10A}">
-      <p15:sldGuideLst xmlns:p15="http://schemas.microsoft.com/office/powerpoint/2012/main"/>
+      <p15:sldGuideLst xmlns:p15="http://schemas.microsoft.com/office/powerpoint/2012/main" xmlns=""/>
     </p:ext>
   </p:extLst>
 </p:presentation>
@@ -203,7 +203,8 @@
           <a:p>
             <a:fld id="{7784FA6D-15E6-4F9E-868F-DFFC0A767720}" type="datetimeFigureOut">
               <a:rPr lang="en-US"/>
-              <a:t>9/3/2016</a:t>
+              <a:pPr/>
+              <a:t>9/6/2016</a:t>
             </a:fld>
             <a:endParaRPr lang="en-US"/>
           </a:p>
@@ -361,6 +362,7 @@
           <a:p>
             <a:fld id="{138B00D2-663C-4B0C-BD6B-3CDB98C06686}" type="slidenum">
               <a:rPr lang="en-US"/>
+              <a:pPr/>
               <a:t>‹#›</a:t>
             </a:fld>
             <a:endParaRPr lang="en-US"/>
@@ -370,7 +372,7 @@
     </p:spTree>
     <p:extLst>
       <p:ext uri="{BB962C8B-B14F-4D97-AF65-F5344CB8AC3E}">
-        <p14:creationId xmlns:p14="http://schemas.microsoft.com/office/powerpoint/2010/main" val="1971647427"/>
+        <p14:creationId xmlns:p14="http://schemas.microsoft.com/office/powerpoint/2010/main" xmlns="" val="1971647427"/>
       </p:ext>
     </p:extLst>
   </p:cSld>
@@ -535,7 +537,8 @@
           <a:p>
             <a:fld id="{138B00D2-663C-4B0C-BD6B-3CDB98C06686}" type="slidenum">
               <a:rPr lang="en-US"/>
-              <a:t>‹#›</a:t>
+              <a:pPr/>
+              <a:t>2</a:t>
             </a:fld>
             <a:endParaRPr lang="en-US"/>
           </a:p>
@@ -544,7 +547,7 @@
     </p:spTree>
     <p:extLst>
       <p:ext uri="{BB962C8B-B14F-4D97-AF65-F5344CB8AC3E}">
-        <p14:creationId xmlns:p14="http://schemas.microsoft.com/office/powerpoint/2010/main" val="4254189914"/>
+        <p14:creationId xmlns:p14="http://schemas.microsoft.com/office/powerpoint/2010/main" xmlns="" val="4254189914"/>
       </p:ext>
     </p:extLst>
   </p:cSld>
@@ -619,7 +622,8 @@
           <a:p>
             <a:fld id="{138B00D2-663C-4B0C-BD6B-3CDB98C06686}" type="slidenum">
               <a:rPr lang="en-US"/>
-              <a:t>‹#›</a:t>
+              <a:pPr/>
+              <a:t>3</a:t>
             </a:fld>
             <a:endParaRPr lang="en-US"/>
           </a:p>
@@ -628,7 +632,7 @@
     </p:spTree>
     <p:extLst>
       <p:ext uri="{BB962C8B-B14F-4D97-AF65-F5344CB8AC3E}">
-        <p14:creationId xmlns:p14="http://schemas.microsoft.com/office/powerpoint/2010/main" val="734500832"/>
+        <p14:creationId xmlns:p14="http://schemas.microsoft.com/office/powerpoint/2010/main" xmlns="" val="734500832"/>
       </p:ext>
     </p:extLst>
   </p:cSld>
@@ -703,7 +707,8 @@
           <a:p>
             <a:fld id="{138B00D2-663C-4B0C-BD6B-3CDB98C06686}" type="slidenum">
               <a:rPr lang="en-US"/>
-              <a:t>‹#›</a:t>
+              <a:pPr/>
+              <a:t>4</a:t>
             </a:fld>
             <a:endParaRPr lang="en-US"/>
           </a:p>
@@ -712,7 +717,7 @@
     </p:spTree>
     <p:extLst>
       <p:ext uri="{BB962C8B-B14F-4D97-AF65-F5344CB8AC3E}">
-        <p14:creationId xmlns:p14="http://schemas.microsoft.com/office/powerpoint/2010/main" val="2406357116"/>
+        <p14:creationId xmlns:p14="http://schemas.microsoft.com/office/powerpoint/2010/main" xmlns="" val="2406357116"/>
       </p:ext>
     </p:extLst>
   </p:cSld>
@@ -787,7 +792,8 @@
           <a:p>
             <a:fld id="{138B00D2-663C-4B0C-BD6B-3CDB98C06686}" type="slidenum">
               <a:rPr lang="en-US"/>
-              <a:t>‹#›</a:t>
+              <a:pPr/>
+              <a:t>5</a:t>
             </a:fld>
             <a:endParaRPr lang="en-US"/>
           </a:p>
@@ -796,7 +802,7 @@
     </p:spTree>
     <p:extLst>
       <p:ext uri="{BB962C8B-B14F-4D97-AF65-F5344CB8AC3E}">
-        <p14:creationId xmlns:p14="http://schemas.microsoft.com/office/powerpoint/2010/main" val="4237934791"/>
+        <p14:creationId xmlns:p14="http://schemas.microsoft.com/office/powerpoint/2010/main" xmlns="" val="4237934791"/>
       </p:ext>
     </p:extLst>
   </p:cSld>
@@ -871,7 +877,8 @@
           <a:p>
             <a:fld id="{138B00D2-663C-4B0C-BD6B-3CDB98C06686}" type="slidenum">
               <a:rPr lang="en-US"/>
-              <a:t>‹#›</a:t>
+              <a:pPr/>
+              <a:t>6</a:t>
             </a:fld>
             <a:endParaRPr lang="en-US"/>
           </a:p>
@@ -880,7 +887,7 @@
     </p:spTree>
     <p:extLst>
       <p:ext uri="{BB962C8B-B14F-4D97-AF65-F5344CB8AC3E}">
-        <p14:creationId xmlns:p14="http://schemas.microsoft.com/office/powerpoint/2010/main" val="1234001251"/>
+        <p14:creationId xmlns:p14="http://schemas.microsoft.com/office/powerpoint/2010/main" xmlns="" val="1234001251"/>
       </p:ext>
     </p:extLst>
   </p:cSld>
@@ -955,7 +962,8 @@
           <a:p>
             <a:fld id="{138B00D2-663C-4B0C-BD6B-3CDB98C06686}" type="slidenum">
               <a:rPr lang="en-US"/>
-              <a:t>‹#›</a:t>
+              <a:pPr/>
+              <a:t>7</a:t>
             </a:fld>
             <a:endParaRPr lang="en-US"/>
           </a:p>
@@ -964,7 +972,7 @@
     </p:spTree>
     <p:extLst>
       <p:ext uri="{BB962C8B-B14F-4D97-AF65-F5344CB8AC3E}">
-        <p14:creationId xmlns:p14="http://schemas.microsoft.com/office/powerpoint/2010/main" val="524151396"/>
+        <p14:creationId xmlns:p14="http://schemas.microsoft.com/office/powerpoint/2010/main" xmlns="" val="524151396"/>
       </p:ext>
     </p:extLst>
   </p:cSld>
@@ -1105,7 +1113,8 @@
           <a:p>
             <a:fld id="{846CE7D5-CF57-46EF-B807-FDD0502418D4}" type="datetimeFigureOut">
               <a:rPr lang="en-US" smtClean="0"/>
-              <a:t>9/3/2016</a:t>
+              <a:pPr/>
+              <a:t>9/6/2016</a:t>
             </a:fld>
             <a:endParaRPr lang="en-US"/>
           </a:p>
@@ -1147,6 +1156,7 @@
           <a:p>
             <a:fld id="{330EA680-D336-4FF7-8B7A-9848BB0A1C32}" type="slidenum">
               <a:rPr lang="en-US" smtClean="0"/>
+              <a:pPr/>
               <a:t>‹#›</a:t>
             </a:fld>
             <a:endParaRPr lang="en-US"/>
@@ -1156,7 +1166,7 @@
     </p:spTree>
     <p:extLst>
       <p:ext uri="{BB962C8B-B14F-4D97-AF65-F5344CB8AC3E}">
-        <p14:creationId xmlns:p14="http://schemas.microsoft.com/office/powerpoint/2010/main" val="2385387890"/>
+        <p14:creationId xmlns:p14="http://schemas.microsoft.com/office/powerpoint/2010/main" xmlns="" val="2385387890"/>
       </p:ext>
     </p:extLst>
   </p:cSld>
@@ -1275,7 +1285,8 @@
           <a:p>
             <a:fld id="{846CE7D5-CF57-46EF-B807-FDD0502418D4}" type="datetimeFigureOut">
               <a:rPr lang="en-US" smtClean="0"/>
-              <a:t>9/3/2016</a:t>
+              <a:pPr/>
+              <a:t>9/6/2016</a:t>
             </a:fld>
             <a:endParaRPr lang="en-US"/>
           </a:p>
@@ -1317,6 +1328,7 @@
           <a:p>
             <a:fld id="{330EA680-D336-4FF7-8B7A-9848BB0A1C32}" type="slidenum">
               <a:rPr lang="en-US" smtClean="0"/>
+              <a:pPr/>
               <a:t>‹#›</a:t>
             </a:fld>
             <a:endParaRPr lang="en-US"/>
@@ -1326,7 +1338,7 @@
     </p:spTree>
     <p:extLst>
       <p:ext uri="{BB962C8B-B14F-4D97-AF65-F5344CB8AC3E}">
-        <p14:creationId xmlns:p14="http://schemas.microsoft.com/office/powerpoint/2010/main" val="2202905451"/>
+        <p14:creationId xmlns:p14="http://schemas.microsoft.com/office/powerpoint/2010/main" xmlns="" val="2202905451"/>
       </p:ext>
     </p:extLst>
   </p:cSld>
@@ -1455,7 +1467,8 @@
           <a:p>
             <a:fld id="{846CE7D5-CF57-46EF-B807-FDD0502418D4}" type="datetimeFigureOut">
               <a:rPr lang="en-US" smtClean="0"/>
-              <a:t>9/3/2016</a:t>
+              <a:pPr/>
+              <a:t>9/6/2016</a:t>
             </a:fld>
             <a:endParaRPr lang="en-US"/>
           </a:p>
@@ -1497,6 +1510,7 @@
           <a:p>
             <a:fld id="{330EA680-D336-4FF7-8B7A-9848BB0A1C32}" type="slidenum">
               <a:rPr lang="en-US" smtClean="0"/>
+              <a:pPr/>
               <a:t>‹#›</a:t>
             </a:fld>
             <a:endParaRPr lang="en-US"/>
@@ -1506,7 +1520,7 @@
     </p:spTree>
     <p:extLst>
       <p:ext uri="{BB962C8B-B14F-4D97-AF65-F5344CB8AC3E}">
-        <p14:creationId xmlns:p14="http://schemas.microsoft.com/office/powerpoint/2010/main" val="3479445657"/>
+        <p14:creationId xmlns:p14="http://schemas.microsoft.com/office/powerpoint/2010/main" xmlns="" val="3479445657"/>
       </p:ext>
     </p:extLst>
   </p:cSld>
@@ -1625,7 +1639,8 @@
           <a:p>
             <a:fld id="{846CE7D5-CF57-46EF-B807-FDD0502418D4}" type="datetimeFigureOut">
               <a:rPr lang="en-US" smtClean="0"/>
-              <a:t>9/3/2016</a:t>
+              <a:pPr/>
+              <a:t>9/6/2016</a:t>
             </a:fld>
             <a:endParaRPr lang="en-US"/>
           </a:p>
@@ -1667,6 +1682,7 @@
           <a:p>
             <a:fld id="{330EA680-D336-4FF7-8B7A-9848BB0A1C32}" type="slidenum">
               <a:rPr lang="en-US" smtClean="0"/>
+              <a:pPr/>
               <a:t>‹#›</a:t>
             </a:fld>
             <a:endParaRPr lang="en-US"/>
@@ -1676,7 +1692,7 @@
     </p:spTree>
     <p:extLst>
       <p:ext uri="{BB962C8B-B14F-4D97-AF65-F5344CB8AC3E}">
-        <p14:creationId xmlns:p14="http://schemas.microsoft.com/office/powerpoint/2010/main" val="949138452"/>
+        <p14:creationId xmlns:p14="http://schemas.microsoft.com/office/powerpoint/2010/main" xmlns="" val="949138452"/>
       </p:ext>
     </p:extLst>
   </p:cSld>
@@ -1871,7 +1887,8 @@
           <a:p>
             <a:fld id="{846CE7D5-CF57-46EF-B807-FDD0502418D4}" type="datetimeFigureOut">
               <a:rPr lang="en-US" smtClean="0"/>
-              <a:t>9/3/2016</a:t>
+              <a:pPr/>
+              <a:t>9/6/2016</a:t>
             </a:fld>
             <a:endParaRPr lang="en-US"/>
           </a:p>
@@ -1913,6 +1930,7 @@
           <a:p>
             <a:fld id="{330EA680-D336-4FF7-8B7A-9848BB0A1C32}" type="slidenum">
               <a:rPr lang="en-US" smtClean="0"/>
+              <a:pPr/>
               <a:t>‹#›</a:t>
             </a:fld>
             <a:endParaRPr lang="en-US"/>
@@ -1922,7 +1940,7 @@
     </p:spTree>
     <p:extLst>
       <p:ext uri="{BB962C8B-B14F-4D97-AF65-F5344CB8AC3E}">
-        <p14:creationId xmlns:p14="http://schemas.microsoft.com/office/powerpoint/2010/main" val="2591524520"/>
+        <p14:creationId xmlns:p14="http://schemas.microsoft.com/office/powerpoint/2010/main" xmlns="" val="2591524520"/>
       </p:ext>
     </p:extLst>
   </p:cSld>
@@ -2103,7 +2121,8 @@
           <a:p>
             <a:fld id="{846CE7D5-CF57-46EF-B807-FDD0502418D4}" type="datetimeFigureOut">
               <a:rPr lang="en-US" smtClean="0"/>
-              <a:t>9/3/2016</a:t>
+              <a:pPr/>
+              <a:t>9/6/2016</a:t>
             </a:fld>
             <a:endParaRPr lang="en-US"/>
           </a:p>
@@ -2145,6 +2164,7 @@
           <a:p>
             <a:fld id="{330EA680-D336-4FF7-8B7A-9848BB0A1C32}" type="slidenum">
               <a:rPr lang="en-US" smtClean="0"/>
+              <a:pPr/>
               <a:t>‹#›</a:t>
             </a:fld>
             <a:endParaRPr lang="en-US"/>
@@ -2154,7 +2174,7 @@
     </p:spTree>
     <p:extLst>
       <p:ext uri="{BB962C8B-B14F-4D97-AF65-F5344CB8AC3E}">
-        <p14:creationId xmlns:p14="http://schemas.microsoft.com/office/powerpoint/2010/main" val="1203092039"/>
+        <p14:creationId xmlns:p14="http://schemas.microsoft.com/office/powerpoint/2010/main" xmlns="" val="1203092039"/>
       </p:ext>
     </p:extLst>
   </p:cSld>
@@ -2470,7 +2490,8 @@
           <a:p>
             <a:fld id="{846CE7D5-CF57-46EF-B807-FDD0502418D4}" type="datetimeFigureOut">
               <a:rPr lang="en-US" smtClean="0"/>
-              <a:t>9/3/2016</a:t>
+              <a:pPr/>
+              <a:t>9/6/2016</a:t>
             </a:fld>
             <a:endParaRPr lang="en-US"/>
           </a:p>
@@ -2512,6 +2533,7 @@
           <a:p>
             <a:fld id="{330EA680-D336-4FF7-8B7A-9848BB0A1C32}" type="slidenum">
               <a:rPr lang="en-US" smtClean="0"/>
+              <a:pPr/>
               <a:t>‹#›</a:t>
             </a:fld>
             <a:endParaRPr lang="en-US"/>
@@ -2521,7 +2543,7 @@
     </p:spTree>
     <p:extLst>
       <p:ext uri="{BB962C8B-B14F-4D97-AF65-F5344CB8AC3E}">
-        <p14:creationId xmlns:p14="http://schemas.microsoft.com/office/powerpoint/2010/main" val="3733172339"/>
+        <p14:creationId xmlns:p14="http://schemas.microsoft.com/office/powerpoint/2010/main" xmlns="" val="3733172339"/>
       </p:ext>
     </p:extLst>
   </p:cSld>
@@ -2588,7 +2610,8 @@
           <a:p>
             <a:fld id="{846CE7D5-CF57-46EF-B807-FDD0502418D4}" type="datetimeFigureOut">
               <a:rPr lang="en-US" smtClean="0"/>
-              <a:t>9/3/2016</a:t>
+              <a:pPr/>
+              <a:t>9/6/2016</a:t>
             </a:fld>
             <a:endParaRPr lang="en-US"/>
           </a:p>
@@ -2630,6 +2653,7 @@
           <a:p>
             <a:fld id="{330EA680-D336-4FF7-8B7A-9848BB0A1C32}" type="slidenum">
               <a:rPr lang="en-US" smtClean="0"/>
+              <a:pPr/>
               <a:t>‹#›</a:t>
             </a:fld>
             <a:endParaRPr lang="en-US"/>
@@ -2639,7 +2663,7 @@
     </p:spTree>
     <p:extLst>
       <p:ext uri="{BB962C8B-B14F-4D97-AF65-F5344CB8AC3E}">
-        <p14:creationId xmlns:p14="http://schemas.microsoft.com/office/powerpoint/2010/main" val="3210312558"/>
+        <p14:creationId xmlns:p14="http://schemas.microsoft.com/office/powerpoint/2010/main" xmlns="" val="3210312558"/>
       </p:ext>
     </p:extLst>
   </p:cSld>
@@ -2683,7 +2707,8 @@
           <a:p>
             <a:fld id="{846CE7D5-CF57-46EF-B807-FDD0502418D4}" type="datetimeFigureOut">
               <a:rPr lang="en-US" smtClean="0"/>
-              <a:t>9/3/2016</a:t>
+              <a:pPr/>
+              <a:t>9/6/2016</a:t>
             </a:fld>
             <a:endParaRPr lang="en-US"/>
           </a:p>
@@ -2725,6 +2750,7 @@
           <a:p>
             <a:fld id="{330EA680-D336-4FF7-8B7A-9848BB0A1C32}" type="slidenum">
               <a:rPr lang="en-US" smtClean="0"/>
+              <a:pPr/>
               <a:t>‹#›</a:t>
             </a:fld>
             <a:endParaRPr lang="en-US"/>
@@ -2734,7 +2760,7 @@
     </p:spTree>
     <p:extLst>
       <p:ext uri="{BB962C8B-B14F-4D97-AF65-F5344CB8AC3E}">
-        <p14:creationId xmlns:p14="http://schemas.microsoft.com/office/powerpoint/2010/main" val="3146388984"/>
+        <p14:creationId xmlns:p14="http://schemas.microsoft.com/office/powerpoint/2010/main" xmlns="" val="3146388984"/>
       </p:ext>
     </p:extLst>
   </p:cSld>
@@ -2960,7 +2986,8 @@
           <a:p>
             <a:fld id="{846CE7D5-CF57-46EF-B807-FDD0502418D4}" type="datetimeFigureOut">
               <a:rPr lang="en-US" smtClean="0"/>
-              <a:t>9/3/2016</a:t>
+              <a:pPr/>
+              <a:t>9/6/2016</a:t>
             </a:fld>
             <a:endParaRPr lang="en-US"/>
           </a:p>
@@ -3002,6 +3029,7 @@
           <a:p>
             <a:fld id="{330EA680-D336-4FF7-8B7A-9848BB0A1C32}" type="slidenum">
               <a:rPr lang="en-US" smtClean="0"/>
+              <a:pPr/>
               <a:t>‹#›</a:t>
             </a:fld>
             <a:endParaRPr lang="en-US"/>
@@ -3011,7 +3039,7 @@
     </p:spTree>
     <p:extLst>
       <p:ext uri="{BB962C8B-B14F-4D97-AF65-F5344CB8AC3E}">
-        <p14:creationId xmlns:p14="http://schemas.microsoft.com/office/powerpoint/2010/main" val="3171841454"/>
+        <p14:creationId xmlns:p14="http://schemas.microsoft.com/office/powerpoint/2010/main" xmlns="" val="3171841454"/>
       </p:ext>
     </p:extLst>
   </p:cSld>
@@ -3217,7 +3245,8 @@
           <a:p>
             <a:fld id="{846CE7D5-CF57-46EF-B807-FDD0502418D4}" type="datetimeFigureOut">
               <a:rPr lang="en-US" smtClean="0"/>
-              <a:t>9/3/2016</a:t>
+              <a:pPr/>
+              <a:t>9/6/2016</a:t>
             </a:fld>
             <a:endParaRPr lang="en-US"/>
           </a:p>
@@ -3259,6 +3288,7 @@
           <a:p>
             <a:fld id="{330EA680-D336-4FF7-8B7A-9848BB0A1C32}" type="slidenum">
               <a:rPr lang="en-US" smtClean="0"/>
+              <a:pPr/>
               <a:t>‹#›</a:t>
             </a:fld>
             <a:endParaRPr lang="en-US"/>
@@ -3268,7 +3298,7 @@
     </p:spTree>
     <p:extLst>
       <p:ext uri="{BB962C8B-B14F-4D97-AF65-F5344CB8AC3E}">
-        <p14:creationId xmlns:p14="http://schemas.microsoft.com/office/powerpoint/2010/main" val="1718958274"/>
+        <p14:creationId xmlns:p14="http://schemas.microsoft.com/office/powerpoint/2010/main" xmlns="" val="1718958274"/>
       </p:ext>
     </p:extLst>
   </p:cSld>
@@ -3430,7 +3460,8 @@
           <a:p>
             <a:fld id="{846CE7D5-CF57-46EF-B807-FDD0502418D4}" type="datetimeFigureOut">
               <a:rPr lang="en-US" smtClean="0"/>
-              <a:t>9/3/2016</a:t>
+              <a:pPr/>
+              <a:t>9/6/2016</a:t>
             </a:fld>
             <a:endParaRPr lang="en-US"/>
           </a:p>
@@ -3508,6 +3539,7 @@
           <a:p>
             <a:fld id="{330EA680-D336-4FF7-8B7A-9848BB0A1C32}" type="slidenum">
               <a:rPr lang="en-US" smtClean="0"/>
+              <a:pPr/>
               <a:t>‹#›</a:t>
             </a:fld>
             <a:endParaRPr lang="en-US"/>
@@ -3517,7 +3549,7 @@
     </p:spTree>
     <p:extLst>
       <p:ext uri="{BB962C8B-B14F-4D97-AF65-F5344CB8AC3E}">
-        <p14:creationId xmlns:p14="http://schemas.microsoft.com/office/powerpoint/2010/main" val="2460954070"/>
+        <p14:creationId xmlns:p14="http://schemas.microsoft.com/office/powerpoint/2010/main" xmlns="" val="2460954070"/>
       </p:ext>
     </p:extLst>
   </p:cSld>
@@ -3863,6 +3895,12 @@
               </a:rPr>
               <a:t>Киевский филиал </a:t>
             </a:r>
+            <a:r>
+              <a:rPr lang="az-Cyrl-AZ" sz="4400" dirty="0">
+                <a:latin typeface="Tahoma" charset="0"/>
+              </a:rPr>
+              <a:t/>
+            </a:r>
             <a:br>
               <a:rPr lang="az-Cyrl-AZ" sz="4400" dirty="0">
                 <a:latin typeface="Tahoma" charset="0"/>
@@ -3936,7 +3974,7 @@
     </p:spTree>
     <p:extLst>
       <p:ext uri="{BB962C8B-B14F-4D97-AF65-F5344CB8AC3E}">
-        <p14:creationId xmlns:p14="http://schemas.microsoft.com/office/powerpoint/2010/main" val="109857222"/>
+        <p14:creationId xmlns:p14="http://schemas.microsoft.com/office/powerpoint/2010/main" xmlns="" val="109857222"/>
       </p:ext>
     </p:extLst>
   </p:cSld>
@@ -4038,7 +4076,7 @@
     </p:spTree>
     <p:extLst>
       <p:ext uri="{BB962C8B-B14F-4D97-AF65-F5344CB8AC3E}">
-        <p14:creationId xmlns:p14="http://schemas.microsoft.com/office/powerpoint/2010/main" val="2182728188"/>
+        <p14:creationId xmlns:p14="http://schemas.microsoft.com/office/powerpoint/2010/main" xmlns="" val="2182728188"/>
       </p:ext>
     </p:extLst>
   </p:cSld>
@@ -4222,7 +4260,7 @@
     </p:spTree>
     <p:extLst>
       <p:ext uri="{BB962C8B-B14F-4D97-AF65-F5344CB8AC3E}">
-        <p14:creationId xmlns:p14="http://schemas.microsoft.com/office/powerpoint/2010/main" val="3924713265"/>
+        <p14:creationId xmlns:p14="http://schemas.microsoft.com/office/powerpoint/2010/main" xmlns="" val="3924713265"/>
       </p:ext>
     </p:extLst>
   </p:cSld>
@@ -4515,7 +4553,7 @@
     </p:spTree>
     <p:extLst>
       <p:ext uri="{BB962C8B-B14F-4D97-AF65-F5344CB8AC3E}">
-        <p14:creationId xmlns:p14="http://schemas.microsoft.com/office/powerpoint/2010/main" val="280830599"/>
+        <p14:creationId xmlns:p14="http://schemas.microsoft.com/office/powerpoint/2010/main" xmlns="" val="280830599"/>
       </p:ext>
     </p:extLst>
   </p:cSld>
@@ -4612,14 +4650,56 @@
           <a:p>
             <a:r>
               <a:rPr lang="en-US" sz="2800" dirty="0"/>
-              <a:t>    Контроллеры оперируют интерфейсами, реализованными поставщиками данных.</a:t>
-            </a:r>
-          </a:p>
-          <a:p>
+              <a:t>    Контроллеры оперируют интерфейсами, реализованными </a:t>
+            </a:r>
+            <a:r>
+              <a:rPr lang="en-US" sz="2800" dirty="0" err="1"/>
+              <a:t>поставщиками</a:t>
+            </a:r>
             <a:r>
               <a:rPr lang="en-US" sz="2800" dirty="0"/>
-              <a:t>   Код покрыт юнит тестами.</a:t>
-            </a:r>
+              <a:t> </a:t>
+            </a:r>
+            <a:r>
+              <a:rPr lang="en-US" sz="2800" dirty="0" err="1" smtClean="0"/>
+              <a:t>данных</a:t>
+            </a:r>
+            <a:r>
+              <a:rPr lang="en-US" sz="2800" dirty="0" smtClean="0"/>
+              <a:t> (</a:t>
+            </a:r>
+            <a:r>
+              <a:rPr lang="en-US" sz="2800" dirty="0" err="1" smtClean="0"/>
+              <a:t>Ninject</a:t>
+            </a:r>
+            <a:r>
+              <a:rPr lang="en-US" sz="2800" dirty="0" smtClean="0"/>
+              <a:t>).</a:t>
+            </a:r>
+            <a:endParaRPr lang="en-US" sz="2800" dirty="0"/>
+          </a:p>
+          <a:p>
+            <a:r>
+              <a:rPr lang="en-US" sz="2800" dirty="0"/>
+              <a:t>   Код покрыт </a:t>
+            </a:r>
+            <a:r>
+              <a:rPr lang="en-US" sz="2800" dirty="0" err="1"/>
+              <a:t>юнит</a:t>
+            </a:r>
+            <a:r>
+              <a:rPr lang="en-US" sz="2800" dirty="0"/>
+              <a:t> </a:t>
+            </a:r>
+            <a:r>
+              <a:rPr lang="en-US" sz="2800" dirty="0" err="1" smtClean="0"/>
+              <a:t>тестами</a:t>
+            </a:r>
+            <a:r>
+              <a:rPr lang="en-US" sz="2800" smtClean="0"/>
+              <a:t>(Mock).</a:t>
+            </a:r>
+            <a:endParaRPr lang="en-US" sz="2800" dirty="0"/>
           </a:p>
           <a:p>
             <a:r>
@@ -4640,7 +4720,7 @@
           </p:nvPr>
         </p:nvPicPr>
         <p:blipFill>
-          <a:blip r:embed="rId3"/>
+          <a:blip r:embed="rId3" cstate="print"/>
           <a:srcRect l="19985" r="19985"/>
           <a:stretch>
             <a:fillRect/>
@@ -4685,7 +4765,7 @@
     </p:spTree>
     <p:extLst>
       <p:ext uri="{BB962C8B-B14F-4D97-AF65-F5344CB8AC3E}">
-        <p14:creationId xmlns:p14="http://schemas.microsoft.com/office/powerpoint/2010/main" val="612372665"/>
+        <p14:creationId xmlns:p14="http://schemas.microsoft.com/office/powerpoint/2010/main" xmlns="" val="612372665"/>
       </p:ext>
     </p:extLst>
   </p:cSld>
@@ -4764,7 +4844,7 @@
         </p:spPr>
         <p:txBody>
           <a:bodyPr vert="horz" lIns="91440" tIns="45720" rIns="91440" bIns="45720" rtlCol="0" anchor="t">
-            <a:normAutofit fontScale="85000" lnSpcReduction="20000"/>
+            <a:normAutofit fontScale="92500" lnSpcReduction="20000"/>
           </a:bodyPr>
           <a:lstStyle/>
           <a:p>
@@ -4830,24 +4910,15 @@
             </a:endParaRPr>
           </a:p>
           <a:p>
-            <a:pPr marL="457200" indent="-457200">
-              <a:buFont typeface="Arial" panose="020B0604020202020204" pitchFamily="34" charset="0"/>
-              <a:buChar char="•"/>
-            </a:pPr>
-            <a:r>
-              <a:rPr lang="en-US" sz="2800" dirty="0">
-                <a:latin typeface="Calibri" charset="0"/>
-              </a:rPr>
-              <a:t> библиотека "Volley" для работы с JSON объектами.</a:t>
-            </a:r>
-          </a:p>
-          <a:p>
-            <a:r>
-              <a:rPr lang="en-US" sz="2800" dirty="0">
+            <a:r>
+              <a:rPr lang="en-US" sz="2800" dirty="0" smtClean="0">
                 <a:latin typeface="Calibri" charset="0"/>
               </a:rPr>
               <a:t> </a:t>
             </a:r>
+            <a:endParaRPr lang="en-US" sz="2800" dirty="0">
+              <a:latin typeface="Calibri" charset="0"/>
+            </a:endParaRPr>
           </a:p>
         </p:txBody>
       </p:sp>
@@ -4862,7 +4933,7 @@
           </p:nvPr>
         </p:nvPicPr>
         <p:blipFill>
-          <a:blip r:embed="rId3"/>
+          <a:blip r:embed="rId3" cstate="print"/>
           <a:srcRect t="17681" b="17681"/>
           <a:stretch>
             <a:fillRect/>
@@ -4878,7 +4949,7 @@
     </p:spTree>
     <p:extLst>
       <p:ext uri="{BB962C8B-B14F-4D97-AF65-F5344CB8AC3E}">
-        <p14:creationId xmlns:p14="http://schemas.microsoft.com/office/powerpoint/2010/main" val="2769761482"/>
+        <p14:creationId xmlns:p14="http://schemas.microsoft.com/office/powerpoint/2010/main" xmlns="" val="2769761482"/>
       </p:ext>
     </p:extLst>
   </p:cSld>
@@ -5012,7 +5083,7 @@
           </p:nvPr>
         </p:nvPicPr>
         <p:blipFill>
-          <a:blip r:embed="rId3"/>
+          <a:blip r:embed="rId3" cstate="print"/>
           <a:srcRect l="11154" r="11154"/>
           <a:stretch>
             <a:fillRect/>
@@ -5028,7 +5099,7 @@
     </p:spTree>
     <p:extLst>
       <p:ext uri="{BB962C8B-B14F-4D97-AF65-F5344CB8AC3E}">
-        <p14:creationId xmlns:p14="http://schemas.microsoft.com/office/powerpoint/2010/main" val="3886244991"/>
+        <p14:creationId xmlns:p14="http://schemas.microsoft.com/office/powerpoint/2010/main" xmlns="" val="3886244991"/>
       </p:ext>
     </p:extLst>
   </p:cSld>
@@ -5081,7 +5152,7 @@
     </a:clrScheme>
     <a:fontScheme name="Office Theme">
       <a:majorFont>
-        <a:latin typeface="Calibri Light" panose="020F0302020204030204"/>
+        <a:latin typeface="Calibri Light"/>
         <a:ea typeface=""/>
         <a:cs typeface=""/>
         <a:font script="Jpan" typeface="ＭＳ Ｐゴシック"/>
@@ -5116,7 +5187,7 @@
         <a:font script="Geor" typeface="Sylfaen"/>
       </a:majorFont>
       <a:minorFont>
-        <a:latin typeface="Calibri" panose="020F0502020204030204"/>
+        <a:latin typeface="Calibri"/>
         <a:ea typeface=""/>
         <a:cs typeface=""/>
         <a:font script="Jpan" typeface="ＭＳ Ｐゴシック"/>
@@ -5293,7 +5364,7 @@
   <a:extraClrSchemeLst/>
   <a:extLst>
     <a:ext uri="{05A4C25C-085E-4340-85A3-A5531E510DB2}">
-      <thm15:themeFamily xmlns:thm15="http://schemas.microsoft.com/office/thememl/2012/main" name="Office Theme" id="{62F939B6-93AF-4DB8-9C6B-D6C7DFDC589F}" vid="{4A3C46E8-61CC-4603-A589-7422A47A8E4A}"/>
+      <thm15:themeFamily xmlns:thm15="http://schemas.microsoft.com/office/thememl/2012/main" xmlns="" name="Office Theme" id="{62F939B6-93AF-4DB8-9C6B-D6C7DFDC589F}" vid="{4A3C46E8-61CC-4603-A589-7422A47A8E4A}"/>
     </a:ext>
   </a:extLst>
 </a:theme>
@@ -5342,7 +5413,7 @@
     </a:clrScheme>
     <a:fontScheme name="Office">
       <a:majorFont>
-        <a:latin typeface="Calibri Light" panose="020F0302020204030204"/>
+        <a:latin typeface="Calibri Light"/>
         <a:ea typeface=""/>
         <a:cs typeface=""/>
         <a:font script="Jpan" typeface="游ゴシック Light"/>
@@ -5394,7 +5465,7 @@
         <a:font script="Tfng" typeface="Ebrima"/>
       </a:majorFont>
       <a:minorFont>
-        <a:latin typeface="Calibri" panose="020F0502020204030204"/>
+        <a:latin typeface="Calibri"/>
         <a:ea typeface=""/>
         <a:cs typeface=""/>
         <a:font script="Jpan" typeface="游ゴシック"/>
@@ -5588,7 +5659,7 @@
   <a:extraClrSchemeLst/>
   <a:extLst>
     <a:ext uri="{05A4C25C-085E-4340-85A3-A5531E510DB2}">
-      <thm15:themeFamily xmlns:thm15="http://schemas.microsoft.com/office/thememl/2012/main" name="Office Theme" id="{62F939B6-93AF-4DB8-9C6B-D6C7DFDC589F}" vid="{4A3C46E8-61CC-4603-A589-7422A47A8E4A}"/>
+      <thm15:themeFamily xmlns:thm15="http://schemas.microsoft.com/office/thememl/2012/main" xmlns="" name="Office Theme" id="{62F939B6-93AF-4DB8-9C6B-D6C7DFDC589F}" vid="{4A3C46E8-61CC-4603-A589-7422A47A8E4A}"/>
     </a:ext>
   </a:extLst>
 </a:theme>

</xml_diff>